<commit_message>
test ajout fichier txt
</commit_message>
<xml_diff>
--- a/git.pptx
+++ b/git.pptx
@@ -5,10 +5,10 @@
     <p:sldMasterId id="2147483648" r:id="rId4"/>
   </p:sldMasterIdLst>
   <p:notesMasterIdLst>
-    <p:notesMasterId r:id="rId13"/>
+    <p:notesMasterId r:id="rId20"/>
   </p:notesMasterIdLst>
   <p:handoutMasterIdLst>
-    <p:handoutMasterId r:id="rId14"/>
+    <p:handoutMasterId r:id="rId21"/>
   </p:handoutMasterIdLst>
   <p:sldIdLst>
     <p:sldId id="256" r:id="rId5"/>
@@ -17,8 +17,15 @@
     <p:sldId id="277" r:id="rId8"/>
     <p:sldId id="278" r:id="rId9"/>
     <p:sldId id="279" r:id="rId10"/>
-    <p:sldId id="267" r:id="rId11"/>
-    <p:sldId id="269" r:id="rId12"/>
+    <p:sldId id="266" r:id="rId11"/>
+    <p:sldId id="267" r:id="rId12"/>
+    <p:sldId id="269" r:id="rId13"/>
+    <p:sldId id="270" r:id="rId14"/>
+    <p:sldId id="271" r:id="rId15"/>
+    <p:sldId id="272" r:id="rId16"/>
+    <p:sldId id="273" r:id="rId17"/>
+    <p:sldId id="274" r:id="rId18"/>
+    <p:sldId id="275" r:id="rId19"/>
   </p:sldIdLst>
   <p:sldSz cx="12192000" cy="6858000"/>
   <p:notesSz cx="6858000" cy="9144000"/>
@@ -141,6 +148,967 @@
 
 <file path=ppt/revisionInfo.xml><?xml version="1.0" encoding="utf-8"?>
 <p1510:revInfo xmlns:a="http://schemas.openxmlformats.org/drawingml/2006/main" xmlns:r="http://schemas.openxmlformats.org/officeDocument/2006/relationships" xmlns:p1510="http://schemas.microsoft.com/office/powerpoint/2015/10/main"/>
+</file>
+
+<file path=ppt/charts/chart1.xml><?xml version="1.0" encoding="utf-8"?>
+<c:chartSpace xmlns:c="http://schemas.openxmlformats.org/drawingml/2006/chart" xmlns:a="http://schemas.openxmlformats.org/drawingml/2006/main" xmlns:r="http://schemas.openxmlformats.org/officeDocument/2006/relationships" xmlns:c16r2="http://schemas.microsoft.com/office/drawing/2015/06/chart">
+  <c:date1904 val="0"/>
+  <c:lang val="fr-FR"/>
+  <c:roundedCorners val="0"/>
+  <mc:AlternateContent xmlns:mc="http://schemas.openxmlformats.org/markup-compatibility/2006">
+    <mc:Choice xmlns:c14="http://schemas.microsoft.com/office/drawing/2007/8/2/chart" Requires="c14">
+      <c14:style val="102"/>
+    </mc:Choice>
+    <mc:Fallback>
+      <c:style val="2"/>
+    </mc:Fallback>
+  </mc:AlternateContent>
+  <c:chart>
+    <c:autoTitleDeleted val="1"/>
+    <c:plotArea>
+      <c:layout/>
+      <c:barChart>
+        <c:barDir val="col"/>
+        <c:grouping val="clustered"/>
+        <c:varyColors val="0"/>
+        <c:ser>
+          <c:idx val="0"/>
+          <c:order val="0"/>
+          <c:tx>
+            <c:strRef>
+              <c:f>Sheet1!$B$1</c:f>
+              <c:strCache>
+                <c:ptCount val="1"/>
+                <c:pt idx="0">
+                  <c:v>Série 1</c:v>
+                </c:pt>
+              </c:strCache>
+            </c:strRef>
+          </c:tx>
+          <c:spPr>
+            <a:solidFill>
+              <a:schemeClr val="accent1"/>
+            </a:solidFill>
+            <a:ln>
+              <a:noFill/>
+            </a:ln>
+            <a:effectLst/>
+          </c:spPr>
+          <c:invertIfNegative val="0"/>
+          <c:cat>
+            <c:strRef>
+              <c:f>Sheet1!$A$2:$A$5</c:f>
+              <c:strCache>
+                <c:ptCount val="4"/>
+                <c:pt idx="0">
+                  <c:v>Catégorie 1</c:v>
+                </c:pt>
+                <c:pt idx="1">
+                  <c:v>Catégorie 2</c:v>
+                </c:pt>
+                <c:pt idx="2">
+                  <c:v>Catégorie 3</c:v>
+                </c:pt>
+                <c:pt idx="3">
+                  <c:v>Catégorie 4</c:v>
+                </c:pt>
+              </c:strCache>
+            </c:strRef>
+          </c:cat>
+          <c:val>
+            <c:numRef>
+              <c:f>Sheet1!$B$2:$B$5</c:f>
+              <c:numCache>
+                <c:formatCode>General</c:formatCode>
+                <c:ptCount val="4"/>
+                <c:pt idx="0">
+                  <c:v>4.3</c:v>
+                </c:pt>
+                <c:pt idx="1">
+                  <c:v>2.5</c:v>
+                </c:pt>
+                <c:pt idx="2">
+                  <c:v>3.5</c:v>
+                </c:pt>
+                <c:pt idx="3">
+                  <c:v>4.5</c:v>
+                </c:pt>
+              </c:numCache>
+            </c:numRef>
+          </c:val>
+          <c:extLst>
+            <c:ext xmlns:c16="http://schemas.microsoft.com/office/drawing/2014/chart" uri="{C3380CC4-5D6E-409C-BE32-E72D297353CC}">
+              <c16:uniqueId val="{00000000-FF9C-48E5-AFE7-A1CEBB46390B}"/>
+            </c:ext>
+          </c:extLst>
+        </c:ser>
+        <c:ser>
+          <c:idx val="1"/>
+          <c:order val="1"/>
+          <c:tx>
+            <c:strRef>
+              <c:f>Sheet1!$C$1</c:f>
+              <c:strCache>
+                <c:ptCount val="1"/>
+                <c:pt idx="0">
+                  <c:v>Série 2</c:v>
+                </c:pt>
+              </c:strCache>
+            </c:strRef>
+          </c:tx>
+          <c:spPr>
+            <a:solidFill>
+              <a:schemeClr val="accent2"/>
+            </a:solidFill>
+            <a:ln>
+              <a:noFill/>
+            </a:ln>
+            <a:effectLst/>
+          </c:spPr>
+          <c:invertIfNegative val="0"/>
+          <c:cat>
+            <c:strRef>
+              <c:f>Sheet1!$A$2:$A$5</c:f>
+              <c:strCache>
+                <c:ptCount val="4"/>
+                <c:pt idx="0">
+                  <c:v>Catégorie 1</c:v>
+                </c:pt>
+                <c:pt idx="1">
+                  <c:v>Catégorie 2</c:v>
+                </c:pt>
+                <c:pt idx="2">
+                  <c:v>Catégorie 3</c:v>
+                </c:pt>
+                <c:pt idx="3">
+                  <c:v>Catégorie 4</c:v>
+                </c:pt>
+              </c:strCache>
+            </c:strRef>
+          </c:cat>
+          <c:val>
+            <c:numRef>
+              <c:f>Sheet1!$C$2:$C$5</c:f>
+              <c:numCache>
+                <c:formatCode>General</c:formatCode>
+                <c:ptCount val="4"/>
+                <c:pt idx="0">
+                  <c:v>2.4</c:v>
+                </c:pt>
+                <c:pt idx="1">
+                  <c:v>4.4000000000000004</c:v>
+                </c:pt>
+                <c:pt idx="2">
+                  <c:v>1.8</c:v>
+                </c:pt>
+                <c:pt idx="3">
+                  <c:v>2.8</c:v>
+                </c:pt>
+              </c:numCache>
+            </c:numRef>
+          </c:val>
+          <c:extLst>
+            <c:ext xmlns:c16="http://schemas.microsoft.com/office/drawing/2014/chart" uri="{C3380CC4-5D6E-409C-BE32-E72D297353CC}">
+              <c16:uniqueId val="{00000001-FF9C-48E5-AFE7-A1CEBB46390B}"/>
+            </c:ext>
+          </c:extLst>
+        </c:ser>
+        <c:ser>
+          <c:idx val="2"/>
+          <c:order val="2"/>
+          <c:tx>
+            <c:strRef>
+              <c:f>Sheet1!$D$1</c:f>
+              <c:strCache>
+                <c:ptCount val="1"/>
+                <c:pt idx="0">
+                  <c:v>Série 3</c:v>
+                </c:pt>
+              </c:strCache>
+            </c:strRef>
+          </c:tx>
+          <c:spPr>
+            <a:solidFill>
+              <a:schemeClr val="accent3"/>
+            </a:solidFill>
+            <a:ln>
+              <a:noFill/>
+            </a:ln>
+            <a:effectLst/>
+          </c:spPr>
+          <c:invertIfNegative val="0"/>
+          <c:cat>
+            <c:strRef>
+              <c:f>Sheet1!$A$2:$A$5</c:f>
+              <c:strCache>
+                <c:ptCount val="4"/>
+                <c:pt idx="0">
+                  <c:v>Catégorie 1</c:v>
+                </c:pt>
+                <c:pt idx="1">
+                  <c:v>Catégorie 2</c:v>
+                </c:pt>
+                <c:pt idx="2">
+                  <c:v>Catégorie 3</c:v>
+                </c:pt>
+                <c:pt idx="3">
+                  <c:v>Catégorie 4</c:v>
+                </c:pt>
+              </c:strCache>
+            </c:strRef>
+          </c:cat>
+          <c:val>
+            <c:numRef>
+              <c:f>Sheet1!$D$2:$D$5</c:f>
+              <c:numCache>
+                <c:formatCode>General</c:formatCode>
+                <c:ptCount val="4"/>
+                <c:pt idx="0">
+                  <c:v>2</c:v>
+                </c:pt>
+                <c:pt idx="1">
+                  <c:v>2</c:v>
+                </c:pt>
+                <c:pt idx="2">
+                  <c:v>3</c:v>
+                </c:pt>
+                <c:pt idx="3">
+                  <c:v>5</c:v>
+                </c:pt>
+              </c:numCache>
+            </c:numRef>
+          </c:val>
+          <c:extLst>
+            <c:ext xmlns:c16="http://schemas.microsoft.com/office/drawing/2014/chart" uri="{C3380CC4-5D6E-409C-BE32-E72D297353CC}">
+              <c16:uniqueId val="{00000002-FF9C-48E5-AFE7-A1CEBB46390B}"/>
+            </c:ext>
+          </c:extLst>
+        </c:ser>
+        <c:dLbls>
+          <c:showLegendKey val="0"/>
+          <c:showVal val="0"/>
+          <c:showCatName val="0"/>
+          <c:showSerName val="0"/>
+          <c:showPercent val="0"/>
+          <c:showBubbleSize val="0"/>
+        </c:dLbls>
+        <c:gapWidth val="219"/>
+        <c:overlap val="-27"/>
+        <c:axId val="738190072"/>
+        <c:axId val="738188112"/>
+      </c:barChart>
+      <c:catAx>
+        <c:axId val="738190072"/>
+        <c:scaling>
+          <c:orientation val="minMax"/>
+        </c:scaling>
+        <c:delete val="0"/>
+        <c:axPos val="b"/>
+        <c:numFmt formatCode="General" sourceLinked="1"/>
+        <c:majorTickMark val="none"/>
+        <c:minorTickMark val="none"/>
+        <c:tickLblPos val="nextTo"/>
+        <c:spPr>
+          <a:noFill/>
+          <a:ln w="9525" cap="flat" cmpd="sng" algn="ctr">
+            <a:solidFill>
+              <a:schemeClr val="tx1">
+                <a:lumMod val="15000"/>
+                <a:lumOff val="85000"/>
+              </a:schemeClr>
+            </a:solidFill>
+            <a:round/>
+          </a:ln>
+          <a:effectLst/>
+        </c:spPr>
+        <c:txPr>
+          <a:bodyPr rot="-60000000" spcFirstLastPara="1" vertOverflow="ellipsis" vert="horz" wrap="square" anchor="ctr" anchorCtr="1"/>
+          <a:lstStyle/>
+          <a:p>
+            <a:pPr>
+              <a:defRPr sz="1197" b="0" i="0" u="none" strike="noStrike" kern="1200" baseline="0">
+                <a:solidFill>
+                  <a:schemeClr val="tx1">
+                    <a:lumMod val="65000"/>
+                    <a:lumOff val="35000"/>
+                  </a:schemeClr>
+                </a:solidFill>
+                <a:latin typeface="+mn-lt"/>
+                <a:ea typeface="+mn-ea"/>
+                <a:cs typeface="+mn-cs"/>
+              </a:defRPr>
+            </a:pPr>
+            <a:endParaRPr lang="fr-FR"/>
+          </a:p>
+        </c:txPr>
+        <c:crossAx val="738188112"/>
+        <c:crosses val="autoZero"/>
+        <c:auto val="1"/>
+        <c:lblAlgn val="ctr"/>
+        <c:lblOffset val="100"/>
+        <c:noMultiLvlLbl val="0"/>
+      </c:catAx>
+      <c:valAx>
+        <c:axId val="738188112"/>
+        <c:scaling>
+          <c:orientation val="minMax"/>
+        </c:scaling>
+        <c:delete val="0"/>
+        <c:axPos val="l"/>
+        <c:majorGridlines>
+          <c:spPr>
+            <a:ln w="9525" cap="flat" cmpd="sng" algn="ctr">
+              <a:solidFill>
+                <a:schemeClr val="tx1">
+                  <a:lumMod val="15000"/>
+                  <a:lumOff val="85000"/>
+                </a:schemeClr>
+              </a:solidFill>
+              <a:round/>
+            </a:ln>
+            <a:effectLst/>
+          </c:spPr>
+        </c:majorGridlines>
+        <c:numFmt formatCode="General" sourceLinked="1"/>
+        <c:majorTickMark val="none"/>
+        <c:minorTickMark val="none"/>
+        <c:tickLblPos val="nextTo"/>
+        <c:spPr>
+          <a:noFill/>
+          <a:ln>
+            <a:noFill/>
+          </a:ln>
+          <a:effectLst/>
+        </c:spPr>
+        <c:txPr>
+          <a:bodyPr rot="-60000000" spcFirstLastPara="1" vertOverflow="ellipsis" vert="horz" wrap="square" anchor="ctr" anchorCtr="1"/>
+          <a:lstStyle/>
+          <a:p>
+            <a:pPr>
+              <a:defRPr sz="1197" b="0" i="0" u="none" strike="noStrike" kern="1200" baseline="0">
+                <a:solidFill>
+                  <a:schemeClr val="tx1">
+                    <a:lumMod val="65000"/>
+                    <a:lumOff val="35000"/>
+                  </a:schemeClr>
+                </a:solidFill>
+                <a:latin typeface="+mn-lt"/>
+                <a:ea typeface="+mn-ea"/>
+                <a:cs typeface="+mn-cs"/>
+              </a:defRPr>
+            </a:pPr>
+            <a:endParaRPr lang="fr-FR"/>
+          </a:p>
+        </c:txPr>
+        <c:crossAx val="738190072"/>
+        <c:crosses val="autoZero"/>
+        <c:crossBetween val="between"/>
+      </c:valAx>
+      <c:spPr>
+        <a:noFill/>
+        <a:ln>
+          <a:noFill/>
+        </a:ln>
+        <a:effectLst/>
+      </c:spPr>
+    </c:plotArea>
+    <c:legend>
+      <c:legendPos val="b"/>
+      <c:overlay val="0"/>
+      <c:spPr>
+        <a:noFill/>
+        <a:ln>
+          <a:noFill/>
+        </a:ln>
+        <a:effectLst/>
+      </c:spPr>
+      <c:txPr>
+        <a:bodyPr rot="0" spcFirstLastPara="1" vertOverflow="ellipsis" vert="horz" wrap="square" anchor="ctr" anchorCtr="1"/>
+        <a:lstStyle/>
+        <a:p>
+          <a:pPr>
+            <a:defRPr sz="1197" b="0" i="0" u="none" strike="noStrike" kern="1200" baseline="0">
+              <a:solidFill>
+                <a:schemeClr val="tx1">
+                  <a:lumMod val="65000"/>
+                  <a:lumOff val="35000"/>
+                </a:schemeClr>
+              </a:solidFill>
+              <a:latin typeface="+mn-lt"/>
+              <a:ea typeface="+mn-ea"/>
+              <a:cs typeface="+mn-cs"/>
+            </a:defRPr>
+          </a:pPr>
+          <a:endParaRPr lang="fr-FR"/>
+        </a:p>
+      </c:txPr>
+    </c:legend>
+    <c:plotVisOnly val="1"/>
+    <c:dispBlanksAs val="gap"/>
+    <c:showDLblsOverMax val="0"/>
+  </c:chart>
+  <c:spPr>
+    <a:noFill/>
+    <a:ln>
+      <a:noFill/>
+    </a:ln>
+    <a:effectLst/>
+  </c:spPr>
+  <c:txPr>
+    <a:bodyPr/>
+    <a:lstStyle/>
+    <a:p>
+      <a:pPr>
+        <a:defRPr/>
+      </a:pPr>
+      <a:endParaRPr lang="fr-FR"/>
+    </a:p>
+  </c:txPr>
+  <c:externalData r:id="rId3">
+    <c:autoUpdate val="0"/>
+  </c:externalData>
+</c:chartSpace>
+</file>
+
+<file path=ppt/charts/colors1.xml><?xml version="1.0" encoding="utf-8"?>
+<cs:colorStyle xmlns:cs="http://schemas.microsoft.com/office/drawing/2012/chartStyle" xmlns:a="http://schemas.openxmlformats.org/drawingml/2006/main" meth="cycle" id="10">
+  <a:schemeClr val="accent1"/>
+  <a:schemeClr val="accent2"/>
+  <a:schemeClr val="accent3"/>
+  <a:schemeClr val="accent4"/>
+  <a:schemeClr val="accent5"/>
+  <a:schemeClr val="accent6"/>
+  <cs:variation/>
+  <cs:variation>
+    <a:lumMod val="60000"/>
+  </cs:variation>
+  <cs:variation>
+    <a:lumMod val="80000"/>
+    <a:lumOff val="20000"/>
+  </cs:variation>
+  <cs:variation>
+    <a:lumMod val="80000"/>
+  </cs:variation>
+  <cs:variation>
+    <a:lumMod val="60000"/>
+    <a:lumOff val="40000"/>
+  </cs:variation>
+  <cs:variation>
+    <a:lumMod val="50000"/>
+  </cs:variation>
+  <cs:variation>
+    <a:lumMod val="70000"/>
+    <a:lumOff val="30000"/>
+  </cs:variation>
+  <cs:variation>
+    <a:lumMod val="70000"/>
+  </cs:variation>
+  <cs:variation>
+    <a:lumMod val="50000"/>
+    <a:lumOff val="50000"/>
+  </cs:variation>
+</cs:colorStyle>
+</file>
+
+<file path=ppt/charts/style1.xml><?xml version="1.0" encoding="utf-8"?>
+<cs:chartStyle xmlns:cs="http://schemas.microsoft.com/office/drawing/2012/chartStyle" xmlns:a="http://schemas.openxmlformats.org/drawingml/2006/main" id="201">
+  <cs:axisTitle>
+    <cs:lnRef idx="0"/>
+    <cs:fillRef idx="0"/>
+    <cs:effectRef idx="0"/>
+    <cs:fontRef idx="minor">
+      <a:schemeClr val="tx1">
+        <a:lumMod val="65000"/>
+        <a:lumOff val="35000"/>
+      </a:schemeClr>
+    </cs:fontRef>
+    <cs:defRPr sz="1330" kern="1200"/>
+  </cs:axisTitle>
+  <cs:categoryAxis>
+    <cs:lnRef idx="0"/>
+    <cs:fillRef idx="0"/>
+    <cs:effectRef idx="0"/>
+    <cs:fontRef idx="minor">
+      <a:schemeClr val="tx1">
+        <a:lumMod val="65000"/>
+        <a:lumOff val="35000"/>
+      </a:schemeClr>
+    </cs:fontRef>
+    <cs:spPr>
+      <a:ln w="9525" cap="flat" cmpd="sng" algn="ctr">
+        <a:solidFill>
+          <a:schemeClr val="tx1">
+            <a:lumMod val="15000"/>
+            <a:lumOff val="85000"/>
+          </a:schemeClr>
+        </a:solidFill>
+        <a:round/>
+      </a:ln>
+    </cs:spPr>
+    <cs:defRPr sz="1197" kern="1200"/>
+  </cs:categoryAxis>
+  <cs:chartArea mods="allowNoFillOverride allowNoLineOverride">
+    <cs:lnRef idx="0"/>
+    <cs:fillRef idx="0"/>
+    <cs:effectRef idx="0"/>
+    <cs:fontRef idx="minor">
+      <a:schemeClr val="tx1"/>
+    </cs:fontRef>
+    <cs:spPr>
+      <a:solidFill>
+        <a:schemeClr val="bg1"/>
+      </a:solidFill>
+      <a:ln w="9525" cap="flat" cmpd="sng" algn="ctr">
+        <a:solidFill>
+          <a:schemeClr val="tx1">
+            <a:lumMod val="15000"/>
+            <a:lumOff val="85000"/>
+          </a:schemeClr>
+        </a:solidFill>
+        <a:round/>
+      </a:ln>
+    </cs:spPr>
+    <cs:defRPr sz="1330" kern="1200"/>
+  </cs:chartArea>
+  <cs:dataLabel>
+    <cs:lnRef idx="0"/>
+    <cs:fillRef idx="0"/>
+    <cs:effectRef idx="0"/>
+    <cs:fontRef idx="minor">
+      <a:schemeClr val="tx1">
+        <a:lumMod val="75000"/>
+        <a:lumOff val="25000"/>
+      </a:schemeClr>
+    </cs:fontRef>
+    <cs:defRPr sz="1197" kern="1200"/>
+  </cs:dataLabel>
+  <cs:dataLabelCallout>
+    <cs:lnRef idx="0"/>
+    <cs:fillRef idx="0"/>
+    <cs:effectRef idx="0"/>
+    <cs:fontRef idx="minor">
+      <a:schemeClr val="dk1">
+        <a:lumMod val="65000"/>
+        <a:lumOff val="35000"/>
+      </a:schemeClr>
+    </cs:fontRef>
+    <cs:spPr>
+      <a:solidFill>
+        <a:schemeClr val="lt1"/>
+      </a:solidFill>
+      <a:ln>
+        <a:solidFill>
+          <a:schemeClr val="dk1">
+            <a:lumMod val="25000"/>
+            <a:lumOff val="75000"/>
+          </a:schemeClr>
+        </a:solidFill>
+      </a:ln>
+    </cs:spPr>
+    <cs:defRPr sz="1197" kern="1200"/>
+    <cs:bodyPr rot="0" spcFirstLastPara="1" vertOverflow="clip" horzOverflow="clip" vert="horz" wrap="square" lIns="36576" tIns="18288" rIns="36576" bIns="18288" anchor="ctr" anchorCtr="1"/>
+  </cs:dataLabelCallout>
+  <cs:dataPoint>
+    <cs:lnRef idx="0"/>
+    <cs:fillRef idx="1">
+      <cs:styleClr val="auto"/>
+    </cs:fillRef>
+    <cs:effectRef idx="0"/>
+    <cs:fontRef idx="minor">
+      <a:schemeClr val="tx1"/>
+    </cs:fontRef>
+  </cs:dataPoint>
+  <cs:dataPoint3D>
+    <cs:lnRef idx="0"/>
+    <cs:fillRef idx="1">
+      <cs:styleClr val="auto"/>
+    </cs:fillRef>
+    <cs:effectRef idx="0"/>
+    <cs:fontRef idx="minor">
+      <a:schemeClr val="tx1"/>
+    </cs:fontRef>
+  </cs:dataPoint3D>
+  <cs:dataPointLine>
+    <cs:lnRef idx="0">
+      <cs:styleClr val="auto"/>
+    </cs:lnRef>
+    <cs:fillRef idx="1"/>
+    <cs:effectRef idx="0"/>
+    <cs:fontRef idx="minor">
+      <a:schemeClr val="tx1"/>
+    </cs:fontRef>
+    <cs:spPr>
+      <a:ln w="28575" cap="rnd">
+        <a:solidFill>
+          <a:schemeClr val="phClr"/>
+        </a:solidFill>
+        <a:round/>
+      </a:ln>
+    </cs:spPr>
+  </cs:dataPointLine>
+  <cs:dataPointMarker>
+    <cs:lnRef idx="0">
+      <cs:styleClr val="auto"/>
+    </cs:lnRef>
+    <cs:fillRef idx="1">
+      <cs:styleClr val="auto"/>
+    </cs:fillRef>
+    <cs:effectRef idx="0"/>
+    <cs:fontRef idx="minor">
+      <a:schemeClr val="tx1"/>
+    </cs:fontRef>
+    <cs:spPr>
+      <a:ln w="9525">
+        <a:solidFill>
+          <a:schemeClr val="phClr"/>
+        </a:solidFill>
+      </a:ln>
+    </cs:spPr>
+  </cs:dataPointMarker>
+  <cs:dataPointMarkerLayout symbol="circle" size="5"/>
+  <cs:dataPointWireframe>
+    <cs:lnRef idx="0">
+      <cs:styleClr val="auto"/>
+    </cs:lnRef>
+    <cs:fillRef idx="1"/>
+    <cs:effectRef idx="0"/>
+    <cs:fontRef idx="minor">
+      <a:schemeClr val="tx1"/>
+    </cs:fontRef>
+    <cs:spPr>
+      <a:ln w="9525" cap="rnd">
+        <a:solidFill>
+          <a:schemeClr val="phClr"/>
+        </a:solidFill>
+        <a:round/>
+      </a:ln>
+    </cs:spPr>
+  </cs:dataPointWireframe>
+  <cs:dataTable>
+    <cs:lnRef idx="0"/>
+    <cs:fillRef idx="0"/>
+    <cs:effectRef idx="0"/>
+    <cs:fontRef idx="minor">
+      <a:schemeClr val="tx1">
+        <a:lumMod val="65000"/>
+        <a:lumOff val="35000"/>
+      </a:schemeClr>
+    </cs:fontRef>
+    <cs:spPr>
+      <a:noFill/>
+      <a:ln w="9525" cap="flat" cmpd="sng" algn="ctr">
+        <a:solidFill>
+          <a:schemeClr val="tx1">
+            <a:lumMod val="15000"/>
+            <a:lumOff val="85000"/>
+          </a:schemeClr>
+        </a:solidFill>
+        <a:round/>
+      </a:ln>
+    </cs:spPr>
+    <cs:defRPr sz="1197" kern="1200"/>
+  </cs:dataTable>
+  <cs:downBar>
+    <cs:lnRef idx="0"/>
+    <cs:fillRef idx="0"/>
+    <cs:effectRef idx="0"/>
+    <cs:fontRef idx="minor">
+      <a:schemeClr val="dk1"/>
+    </cs:fontRef>
+    <cs:spPr>
+      <a:solidFill>
+        <a:schemeClr val="dk1">
+          <a:lumMod val="65000"/>
+          <a:lumOff val="35000"/>
+        </a:schemeClr>
+      </a:solidFill>
+      <a:ln w="9525">
+        <a:solidFill>
+          <a:schemeClr val="tx1">
+            <a:lumMod val="65000"/>
+            <a:lumOff val="35000"/>
+          </a:schemeClr>
+        </a:solidFill>
+      </a:ln>
+    </cs:spPr>
+  </cs:downBar>
+  <cs:dropLine>
+    <cs:lnRef idx="0"/>
+    <cs:fillRef idx="0"/>
+    <cs:effectRef idx="0"/>
+    <cs:fontRef idx="minor">
+      <a:schemeClr val="tx1"/>
+    </cs:fontRef>
+    <cs:spPr>
+      <a:ln w="9525" cap="flat" cmpd="sng" algn="ctr">
+        <a:solidFill>
+          <a:schemeClr val="tx1">
+            <a:lumMod val="35000"/>
+            <a:lumOff val="65000"/>
+          </a:schemeClr>
+        </a:solidFill>
+        <a:round/>
+      </a:ln>
+    </cs:spPr>
+  </cs:dropLine>
+  <cs:errorBar>
+    <cs:lnRef idx="0"/>
+    <cs:fillRef idx="0"/>
+    <cs:effectRef idx="0"/>
+    <cs:fontRef idx="minor">
+      <a:schemeClr val="tx1"/>
+    </cs:fontRef>
+    <cs:spPr>
+      <a:ln w="9525" cap="flat" cmpd="sng" algn="ctr">
+        <a:solidFill>
+          <a:schemeClr val="tx1">
+            <a:lumMod val="65000"/>
+            <a:lumOff val="35000"/>
+          </a:schemeClr>
+        </a:solidFill>
+        <a:round/>
+      </a:ln>
+    </cs:spPr>
+  </cs:errorBar>
+  <cs:floor>
+    <cs:lnRef idx="0"/>
+    <cs:fillRef idx="0"/>
+    <cs:effectRef idx="0"/>
+    <cs:fontRef idx="minor">
+      <a:schemeClr val="tx1"/>
+    </cs:fontRef>
+    <cs:spPr>
+      <a:noFill/>
+      <a:ln>
+        <a:noFill/>
+      </a:ln>
+    </cs:spPr>
+  </cs:floor>
+  <cs:gridlineMajor>
+    <cs:lnRef idx="0"/>
+    <cs:fillRef idx="0"/>
+    <cs:effectRef idx="0"/>
+    <cs:fontRef idx="minor">
+      <a:schemeClr val="tx1"/>
+    </cs:fontRef>
+    <cs:spPr>
+      <a:ln w="9525" cap="flat" cmpd="sng" algn="ctr">
+        <a:solidFill>
+          <a:schemeClr val="tx1">
+            <a:lumMod val="15000"/>
+            <a:lumOff val="85000"/>
+          </a:schemeClr>
+        </a:solidFill>
+        <a:round/>
+      </a:ln>
+    </cs:spPr>
+  </cs:gridlineMajor>
+  <cs:gridlineMinor>
+    <cs:lnRef idx="0"/>
+    <cs:fillRef idx="0"/>
+    <cs:effectRef idx="0"/>
+    <cs:fontRef idx="minor">
+      <a:schemeClr val="tx1"/>
+    </cs:fontRef>
+    <cs:spPr>
+      <a:ln w="9525" cap="flat" cmpd="sng" algn="ctr">
+        <a:solidFill>
+          <a:schemeClr val="tx1">
+            <a:lumMod val="5000"/>
+            <a:lumOff val="95000"/>
+          </a:schemeClr>
+        </a:solidFill>
+        <a:round/>
+      </a:ln>
+    </cs:spPr>
+  </cs:gridlineMinor>
+  <cs:hiLoLine>
+    <cs:lnRef idx="0"/>
+    <cs:fillRef idx="0"/>
+    <cs:effectRef idx="0"/>
+    <cs:fontRef idx="minor">
+      <a:schemeClr val="tx1"/>
+    </cs:fontRef>
+    <cs:spPr>
+      <a:ln w="9525" cap="flat" cmpd="sng" algn="ctr">
+        <a:solidFill>
+          <a:schemeClr val="tx1">
+            <a:lumMod val="75000"/>
+            <a:lumOff val="25000"/>
+          </a:schemeClr>
+        </a:solidFill>
+        <a:round/>
+      </a:ln>
+    </cs:spPr>
+  </cs:hiLoLine>
+  <cs:leaderLine>
+    <cs:lnRef idx="0"/>
+    <cs:fillRef idx="0"/>
+    <cs:effectRef idx="0"/>
+    <cs:fontRef idx="minor">
+      <a:schemeClr val="tx1"/>
+    </cs:fontRef>
+    <cs:spPr>
+      <a:ln w="9525" cap="flat" cmpd="sng" algn="ctr">
+        <a:solidFill>
+          <a:schemeClr val="tx1">
+            <a:lumMod val="35000"/>
+            <a:lumOff val="65000"/>
+          </a:schemeClr>
+        </a:solidFill>
+        <a:round/>
+      </a:ln>
+    </cs:spPr>
+  </cs:leaderLine>
+  <cs:legend>
+    <cs:lnRef idx="0"/>
+    <cs:fillRef idx="0"/>
+    <cs:effectRef idx="0"/>
+    <cs:fontRef idx="minor">
+      <a:schemeClr val="tx1">
+        <a:lumMod val="65000"/>
+        <a:lumOff val="35000"/>
+      </a:schemeClr>
+    </cs:fontRef>
+    <cs:defRPr sz="1197" kern="1200"/>
+  </cs:legend>
+  <cs:plotArea mods="allowNoFillOverride allowNoLineOverride">
+    <cs:lnRef idx="0"/>
+    <cs:fillRef idx="0"/>
+    <cs:effectRef idx="0"/>
+    <cs:fontRef idx="minor">
+      <a:schemeClr val="tx1"/>
+    </cs:fontRef>
+  </cs:plotArea>
+  <cs:plotArea3D mods="allowNoFillOverride allowNoLineOverride">
+    <cs:lnRef idx="0"/>
+    <cs:fillRef idx="0"/>
+    <cs:effectRef idx="0"/>
+    <cs:fontRef idx="minor">
+      <a:schemeClr val="tx1"/>
+    </cs:fontRef>
+  </cs:plotArea3D>
+  <cs:seriesAxis>
+    <cs:lnRef idx="0"/>
+    <cs:fillRef idx="0"/>
+    <cs:effectRef idx="0"/>
+    <cs:fontRef idx="minor">
+      <a:schemeClr val="tx1">
+        <a:lumMod val="65000"/>
+        <a:lumOff val="35000"/>
+      </a:schemeClr>
+    </cs:fontRef>
+    <cs:defRPr sz="1197" kern="1200"/>
+  </cs:seriesAxis>
+  <cs:seriesLine>
+    <cs:lnRef idx="0"/>
+    <cs:fillRef idx="0"/>
+    <cs:effectRef idx="0"/>
+    <cs:fontRef idx="minor">
+      <a:schemeClr val="tx1"/>
+    </cs:fontRef>
+    <cs:spPr>
+      <a:ln w="9525" cap="flat" cmpd="sng" algn="ctr">
+        <a:solidFill>
+          <a:schemeClr val="tx1">
+            <a:lumMod val="35000"/>
+            <a:lumOff val="65000"/>
+          </a:schemeClr>
+        </a:solidFill>
+        <a:round/>
+      </a:ln>
+    </cs:spPr>
+  </cs:seriesLine>
+  <cs:title>
+    <cs:lnRef idx="0"/>
+    <cs:fillRef idx="0"/>
+    <cs:effectRef idx="0"/>
+    <cs:fontRef idx="minor">
+      <a:schemeClr val="tx1">
+        <a:lumMod val="65000"/>
+        <a:lumOff val="35000"/>
+      </a:schemeClr>
+    </cs:fontRef>
+    <cs:defRPr sz="1862" b="0" kern="1200" spc="0" baseline="0"/>
+  </cs:title>
+  <cs:trendline>
+    <cs:lnRef idx="0">
+      <cs:styleClr val="auto"/>
+    </cs:lnRef>
+    <cs:fillRef idx="0"/>
+    <cs:effectRef idx="0"/>
+    <cs:fontRef idx="minor">
+      <a:schemeClr val="tx1"/>
+    </cs:fontRef>
+    <cs:spPr>
+      <a:ln w="19050" cap="rnd">
+        <a:solidFill>
+          <a:schemeClr val="phClr"/>
+        </a:solidFill>
+        <a:prstDash val="sysDot"/>
+      </a:ln>
+    </cs:spPr>
+  </cs:trendline>
+  <cs:trendlineLabel>
+    <cs:lnRef idx="0"/>
+    <cs:fillRef idx="0"/>
+    <cs:effectRef idx="0"/>
+    <cs:fontRef idx="minor">
+      <a:schemeClr val="tx1">
+        <a:lumMod val="65000"/>
+        <a:lumOff val="35000"/>
+      </a:schemeClr>
+    </cs:fontRef>
+    <cs:defRPr sz="1197" kern="1200"/>
+  </cs:trendlineLabel>
+  <cs:upBar>
+    <cs:lnRef idx="0"/>
+    <cs:fillRef idx="0"/>
+    <cs:effectRef idx="0"/>
+    <cs:fontRef idx="minor">
+      <a:schemeClr val="dk1"/>
+    </cs:fontRef>
+    <cs:spPr>
+      <a:solidFill>
+        <a:schemeClr val="lt1"/>
+      </a:solidFill>
+      <a:ln w="9525">
+        <a:solidFill>
+          <a:schemeClr val="tx1">
+            <a:lumMod val="15000"/>
+            <a:lumOff val="85000"/>
+          </a:schemeClr>
+        </a:solidFill>
+      </a:ln>
+    </cs:spPr>
+  </cs:upBar>
+  <cs:valueAxis>
+    <cs:lnRef idx="0"/>
+    <cs:fillRef idx="0"/>
+    <cs:effectRef idx="0"/>
+    <cs:fontRef idx="minor">
+      <a:schemeClr val="tx1">
+        <a:lumMod val="65000"/>
+        <a:lumOff val="35000"/>
+      </a:schemeClr>
+    </cs:fontRef>
+    <cs:defRPr sz="1197" kern="1200"/>
+  </cs:valueAxis>
+  <cs:wall>
+    <cs:lnRef idx="0"/>
+    <cs:fillRef idx="0"/>
+    <cs:effectRef idx="0"/>
+    <cs:fontRef idx="minor">
+      <a:schemeClr val="tx1"/>
+    </cs:fontRef>
+    <cs:spPr>
+      <a:noFill/>
+      <a:ln>
+        <a:noFill/>
+      </a:ln>
+    </cs:spPr>
+  </cs:wall>
+</cs:chartStyle>
 </file>
 
 <file path=ppt/diagrams/colors1.xml><?xml version="1.0" encoding="utf-8"?>
@@ -5760,6 +6728,91 @@
 </p:notesMaster>
 </file>
 
+<file path=ppt/notesSlides/notesSlide1.xml><?xml version="1.0" encoding="utf-8"?>
+<p:notes xmlns:a="http://schemas.openxmlformats.org/drawingml/2006/main" xmlns:r="http://schemas.openxmlformats.org/officeDocument/2006/relationships" xmlns:p="http://schemas.openxmlformats.org/presentationml/2006/main">
+  <p:cSld>
+    <p:spTree>
+      <p:nvGrpSpPr>
+        <p:cNvPr id="1" name=""/>
+        <p:cNvGrpSpPr/>
+        <p:nvPr/>
+      </p:nvGrpSpPr>
+      <p:grpSpPr>
+        <a:xfrm>
+          <a:off x="0" y="0"/>
+          <a:ext cx="0" cy="0"/>
+          <a:chOff x="0" y="0"/>
+          <a:chExt cx="0" cy="0"/>
+        </a:xfrm>
+      </p:grpSpPr>
+      <p:sp>
+        <p:nvSpPr>
+          <p:cNvPr id="2" name="Espace réservé de l'image des diapositives 1"/>
+          <p:cNvSpPr>
+            <a:spLocks noGrp="1" noRot="1" noChangeAspect="1"/>
+          </p:cNvSpPr>
+          <p:nvPr>
+            <p:ph type="sldImg"/>
+          </p:nvPr>
+        </p:nvSpPr>
+        <p:spPr/>
+      </p:sp>
+      <p:sp>
+        <p:nvSpPr>
+          <p:cNvPr id="3" name="Espace réservé des notes 2"/>
+          <p:cNvSpPr>
+            <a:spLocks noGrp="1"/>
+          </p:cNvSpPr>
+          <p:nvPr>
+            <p:ph type="body" idx="1"/>
+          </p:nvPr>
+        </p:nvSpPr>
+        <p:spPr/>
+        <p:txBody>
+          <a:bodyPr/>
+          <a:lstStyle/>
+          <a:p>
+            <a:endParaRPr lang="fr-FR"/>
+          </a:p>
+        </p:txBody>
+      </p:sp>
+      <p:sp>
+        <p:nvSpPr>
+          <p:cNvPr id="4" name="Espace réservé du numéro de diapositive 3"/>
+          <p:cNvSpPr>
+            <a:spLocks noGrp="1"/>
+          </p:cNvSpPr>
+          <p:nvPr>
+            <p:ph type="sldNum" sz="quarter" idx="10"/>
+          </p:nvPr>
+        </p:nvSpPr>
+        <p:spPr/>
+        <p:txBody>
+          <a:bodyPr/>
+          <a:lstStyle/>
+          <a:p>
+            <a:fld id="{5EE2CF44-2B13-41B4-A334-1CDF534EEBBF}" type="slidenum">
+              <a:rPr lang="fr-FR" smtClean="0"/>
+              <a:pPr/>
+              <a:t>15</a:t>
+            </a:fld>
+            <a:endParaRPr lang="fr-FR" dirty="0"/>
+          </a:p>
+        </p:txBody>
+      </p:sp>
+    </p:spTree>
+    <p:extLst>
+      <p:ext uri="{BB962C8B-B14F-4D97-AF65-F5344CB8AC3E}">
+        <p14:creationId xmlns:p14="http://schemas.microsoft.com/office/powerpoint/2010/main" val="3459061200"/>
+      </p:ext>
+    </p:extLst>
+  </p:cSld>
+  <p:clrMapOvr>
+    <a:masterClrMapping/>
+  </p:clrMapOvr>
+</p:notes>
+</file>
+
 <file path=ppt/slideLayouts/slideLayout1.xml><?xml version="1.0" encoding="utf-8"?>
 <p:sldLayout xmlns:a="http://schemas.openxmlformats.org/drawingml/2006/main" xmlns:r="http://schemas.openxmlformats.org/officeDocument/2006/relationships" xmlns:p="http://schemas.openxmlformats.org/presentationml/2006/main" type="title" preserve="1">
   <p:cSld name="Diapositive de titre">
@@ -9022,6 +10075,458 @@
 </p:sld>
 </file>
 
+<file path=ppt/slides/slide10.xml><?xml version="1.0" encoding="utf-8"?>
+<p:sld xmlns:a="http://schemas.openxmlformats.org/drawingml/2006/main" xmlns:r="http://schemas.openxmlformats.org/officeDocument/2006/relationships" xmlns:p="http://schemas.openxmlformats.org/presentationml/2006/main">
+  <p:cSld>
+    <p:spTree>
+      <p:nvGrpSpPr>
+        <p:cNvPr id="1" name=""/>
+        <p:cNvGrpSpPr/>
+        <p:nvPr/>
+      </p:nvGrpSpPr>
+      <p:grpSpPr>
+        <a:xfrm>
+          <a:off x="0" y="0"/>
+          <a:ext cx="0" cy="0"/>
+          <a:chOff x="0" y="0"/>
+          <a:chExt cx="0" cy="0"/>
+        </a:xfrm>
+      </p:grpSpPr>
+      <p:sp>
+        <p:nvSpPr>
+          <p:cNvPr id="2" name="Titre 1"/>
+          <p:cNvSpPr>
+            <a:spLocks noGrp="1"/>
+          </p:cNvSpPr>
+          <p:nvPr>
+            <p:ph type="title"/>
+          </p:nvPr>
+        </p:nvSpPr>
+        <p:spPr/>
+        <p:txBody>
+          <a:bodyPr rtlCol="0"/>
+          <a:lstStyle/>
+          <a:p>
+            <a:pPr rtl="0"/>
+            <a:endParaRPr lang="fr-FR" dirty="0"/>
+          </a:p>
+        </p:txBody>
+      </p:sp>
+      <p:sp>
+        <p:nvSpPr>
+          <p:cNvPr id="3" name="Espace réservé du texte 2"/>
+          <p:cNvSpPr>
+            <a:spLocks noGrp="1"/>
+          </p:cNvSpPr>
+          <p:nvPr>
+            <p:ph type="body" idx="1"/>
+          </p:nvPr>
+        </p:nvSpPr>
+        <p:spPr/>
+        <p:txBody>
+          <a:bodyPr rtlCol="0"/>
+          <a:lstStyle/>
+          <a:p>
+            <a:pPr rtl="0"/>
+            <a:endParaRPr lang="fr-FR" dirty="0"/>
+          </a:p>
+        </p:txBody>
+      </p:sp>
+    </p:spTree>
+    <p:extLst>
+      <p:ext uri="{BB962C8B-B14F-4D97-AF65-F5344CB8AC3E}">
+        <p14:creationId xmlns:p14="http://schemas.microsoft.com/office/powerpoint/2010/main" val="3444435236"/>
+      </p:ext>
+    </p:extLst>
+  </p:cSld>
+  <p:clrMapOvr>
+    <a:masterClrMapping/>
+  </p:clrMapOvr>
+</p:sld>
+</file>
+
+<file path=ppt/slides/slide11.xml><?xml version="1.0" encoding="utf-8"?>
+<p:sld xmlns:a="http://schemas.openxmlformats.org/drawingml/2006/main" xmlns:r="http://schemas.openxmlformats.org/officeDocument/2006/relationships" xmlns:p="http://schemas.openxmlformats.org/presentationml/2006/main">
+  <p:cSld>
+    <p:spTree>
+      <p:nvGrpSpPr>
+        <p:cNvPr id="1" name=""/>
+        <p:cNvGrpSpPr/>
+        <p:nvPr/>
+      </p:nvGrpSpPr>
+      <p:grpSpPr>
+        <a:xfrm>
+          <a:off x="0" y="0"/>
+          <a:ext cx="0" cy="0"/>
+          <a:chOff x="0" y="0"/>
+          <a:chExt cx="0" cy="0"/>
+        </a:xfrm>
+      </p:grpSpPr>
+      <p:sp>
+        <p:nvSpPr>
+          <p:cNvPr id="2" name="Titre 1"/>
+          <p:cNvSpPr>
+            <a:spLocks noGrp="1"/>
+          </p:cNvSpPr>
+          <p:nvPr>
+            <p:ph type="title"/>
+          </p:nvPr>
+        </p:nvSpPr>
+        <p:spPr/>
+        <p:txBody>
+          <a:bodyPr rtlCol="0"/>
+          <a:lstStyle/>
+          <a:p>
+            <a:pPr rtl="0"/>
+            <a:endParaRPr lang="fr-FR" dirty="0"/>
+          </a:p>
+        </p:txBody>
+      </p:sp>
+      <p:sp>
+        <p:nvSpPr>
+          <p:cNvPr id="3" name="Espace réservé du texte 2"/>
+          <p:cNvSpPr>
+            <a:spLocks noGrp="1"/>
+          </p:cNvSpPr>
+          <p:nvPr>
+            <p:ph type="body" idx="1"/>
+          </p:nvPr>
+        </p:nvSpPr>
+        <p:spPr/>
+        <p:txBody>
+          <a:bodyPr rtlCol="0"/>
+          <a:lstStyle/>
+          <a:p>
+            <a:pPr rtl="0"/>
+            <a:endParaRPr lang="fr-FR" dirty="0"/>
+          </a:p>
+        </p:txBody>
+      </p:sp>
+      <p:sp>
+        <p:nvSpPr>
+          <p:cNvPr id="4" name="Espace réservé du contenu 3"/>
+          <p:cNvSpPr>
+            <a:spLocks noGrp="1"/>
+          </p:cNvSpPr>
+          <p:nvPr>
+            <p:ph sz="half" idx="2"/>
+          </p:nvPr>
+        </p:nvSpPr>
+        <p:spPr/>
+        <p:txBody>
+          <a:bodyPr rtlCol="0"/>
+          <a:lstStyle/>
+          <a:p>
+            <a:pPr rtl="0"/>
+            <a:endParaRPr lang="fr-FR" dirty="0"/>
+          </a:p>
+        </p:txBody>
+      </p:sp>
+      <p:sp>
+        <p:nvSpPr>
+          <p:cNvPr id="5" name="Espace réservé du texte 4"/>
+          <p:cNvSpPr>
+            <a:spLocks noGrp="1"/>
+          </p:cNvSpPr>
+          <p:nvPr>
+            <p:ph type="body" sz="quarter" idx="3"/>
+          </p:nvPr>
+        </p:nvSpPr>
+        <p:spPr/>
+        <p:txBody>
+          <a:bodyPr rtlCol="0"/>
+          <a:lstStyle/>
+          <a:p>
+            <a:pPr rtl="0"/>
+            <a:endParaRPr lang="fr-FR" dirty="0"/>
+          </a:p>
+        </p:txBody>
+      </p:sp>
+      <p:sp>
+        <p:nvSpPr>
+          <p:cNvPr id="6" name="Espace réservé du contenu 5"/>
+          <p:cNvSpPr>
+            <a:spLocks noGrp="1"/>
+          </p:cNvSpPr>
+          <p:nvPr>
+            <p:ph sz="quarter" idx="4"/>
+          </p:nvPr>
+        </p:nvSpPr>
+        <p:spPr/>
+        <p:txBody>
+          <a:bodyPr rtlCol="0"/>
+          <a:lstStyle/>
+          <a:p>
+            <a:pPr rtl="0"/>
+            <a:endParaRPr lang="fr-FR" dirty="0"/>
+          </a:p>
+        </p:txBody>
+      </p:sp>
+    </p:spTree>
+    <p:extLst>
+      <p:ext uri="{BB962C8B-B14F-4D97-AF65-F5344CB8AC3E}">
+        <p14:creationId xmlns:p14="http://schemas.microsoft.com/office/powerpoint/2010/main" val="1475842300"/>
+      </p:ext>
+    </p:extLst>
+  </p:cSld>
+  <p:clrMapOvr>
+    <a:masterClrMapping/>
+  </p:clrMapOvr>
+</p:sld>
+</file>
+
+<file path=ppt/slides/slide12.xml><?xml version="1.0" encoding="utf-8"?>
+<p:sld xmlns:a="http://schemas.openxmlformats.org/drawingml/2006/main" xmlns:r="http://schemas.openxmlformats.org/officeDocument/2006/relationships" xmlns:p="http://schemas.openxmlformats.org/presentationml/2006/main">
+  <p:cSld>
+    <p:spTree>
+      <p:nvGrpSpPr>
+        <p:cNvPr id="1" name=""/>
+        <p:cNvGrpSpPr/>
+        <p:nvPr/>
+      </p:nvGrpSpPr>
+      <p:grpSpPr>
+        <a:xfrm>
+          <a:off x="0" y="0"/>
+          <a:ext cx="0" cy="0"/>
+          <a:chOff x="0" y="0"/>
+          <a:chExt cx="0" cy="0"/>
+        </a:xfrm>
+      </p:grpSpPr>
+      <p:sp>
+        <p:nvSpPr>
+          <p:cNvPr id="2" name="Titre 1"/>
+          <p:cNvSpPr>
+            <a:spLocks noGrp="1"/>
+          </p:cNvSpPr>
+          <p:nvPr>
+            <p:ph type="title"/>
+          </p:nvPr>
+        </p:nvSpPr>
+        <p:spPr/>
+        <p:txBody>
+          <a:bodyPr rtlCol="0"/>
+          <a:lstStyle/>
+          <a:p>
+            <a:pPr rtl="0"/>
+            <a:endParaRPr lang="fr-FR" dirty="0"/>
+          </a:p>
+        </p:txBody>
+      </p:sp>
+    </p:spTree>
+    <p:extLst>
+      <p:ext uri="{BB962C8B-B14F-4D97-AF65-F5344CB8AC3E}">
+        <p14:creationId xmlns:p14="http://schemas.microsoft.com/office/powerpoint/2010/main" val="215988672"/>
+      </p:ext>
+    </p:extLst>
+  </p:cSld>
+  <p:clrMapOvr>
+    <a:masterClrMapping/>
+  </p:clrMapOvr>
+</p:sld>
+</file>
+
+<file path=ppt/slides/slide13.xml><?xml version="1.0" encoding="utf-8"?>
+<p:sld xmlns:a="http://schemas.openxmlformats.org/drawingml/2006/main" xmlns:r="http://schemas.openxmlformats.org/officeDocument/2006/relationships" xmlns:p="http://schemas.openxmlformats.org/presentationml/2006/main">
+  <p:cSld>
+    <p:spTree>
+      <p:nvGrpSpPr>
+        <p:cNvPr id="1" name=""/>
+        <p:cNvGrpSpPr/>
+        <p:nvPr/>
+      </p:nvGrpSpPr>
+      <p:grpSpPr>
+        <a:xfrm>
+          <a:off x="0" y="0"/>
+          <a:ext cx="0" cy="0"/>
+          <a:chOff x="0" y="0"/>
+          <a:chExt cx="0" cy="0"/>
+        </a:xfrm>
+      </p:grpSpPr>
+    </p:spTree>
+    <p:extLst>
+      <p:ext uri="{BB962C8B-B14F-4D97-AF65-F5344CB8AC3E}">
+        <p14:creationId xmlns:p14="http://schemas.microsoft.com/office/powerpoint/2010/main" val="3661180859"/>
+      </p:ext>
+    </p:extLst>
+  </p:cSld>
+  <p:clrMapOvr>
+    <a:masterClrMapping/>
+  </p:clrMapOvr>
+</p:sld>
+</file>
+
+<file path=ppt/slides/slide14.xml><?xml version="1.0" encoding="utf-8"?>
+<p:sld xmlns:a="http://schemas.openxmlformats.org/drawingml/2006/main" xmlns:r="http://schemas.openxmlformats.org/officeDocument/2006/relationships" xmlns:p="http://schemas.openxmlformats.org/presentationml/2006/main">
+  <p:cSld>
+    <p:spTree>
+      <p:nvGrpSpPr>
+        <p:cNvPr id="1" name=""/>
+        <p:cNvGrpSpPr/>
+        <p:nvPr/>
+      </p:nvGrpSpPr>
+      <p:grpSpPr>
+        <a:xfrm>
+          <a:off x="0" y="0"/>
+          <a:ext cx="0" cy="0"/>
+          <a:chOff x="0" y="0"/>
+          <a:chExt cx="0" cy="0"/>
+        </a:xfrm>
+      </p:grpSpPr>
+      <p:sp>
+        <p:nvSpPr>
+          <p:cNvPr id="2" name="Titre 1"/>
+          <p:cNvSpPr>
+            <a:spLocks noGrp="1"/>
+          </p:cNvSpPr>
+          <p:nvPr>
+            <p:ph type="title"/>
+          </p:nvPr>
+        </p:nvSpPr>
+        <p:spPr/>
+        <p:txBody>
+          <a:bodyPr rtlCol="0"/>
+          <a:lstStyle/>
+          <a:p>
+            <a:pPr rtl="0"/>
+            <a:endParaRPr lang="fr-FR" dirty="0"/>
+          </a:p>
+        </p:txBody>
+      </p:sp>
+      <p:sp>
+        <p:nvSpPr>
+          <p:cNvPr id="3" name="Espace réservé du contenu 2"/>
+          <p:cNvSpPr>
+            <a:spLocks noGrp="1"/>
+          </p:cNvSpPr>
+          <p:nvPr>
+            <p:ph idx="1"/>
+          </p:nvPr>
+        </p:nvSpPr>
+        <p:spPr/>
+        <p:txBody>
+          <a:bodyPr rtlCol="0"/>
+          <a:lstStyle/>
+          <a:p>
+            <a:pPr rtl="0"/>
+            <a:endParaRPr lang="fr-FR" dirty="0"/>
+          </a:p>
+        </p:txBody>
+      </p:sp>
+      <p:sp>
+        <p:nvSpPr>
+          <p:cNvPr id="4" name="Espace réservé du texte 3"/>
+          <p:cNvSpPr>
+            <a:spLocks noGrp="1"/>
+          </p:cNvSpPr>
+          <p:nvPr>
+            <p:ph type="body" sz="half" idx="2"/>
+          </p:nvPr>
+        </p:nvSpPr>
+        <p:spPr/>
+        <p:txBody>
+          <a:bodyPr rtlCol="0"/>
+          <a:lstStyle/>
+          <a:p>
+            <a:pPr rtl="0"/>
+            <a:endParaRPr lang="fr-FR" dirty="0"/>
+          </a:p>
+        </p:txBody>
+      </p:sp>
+    </p:spTree>
+    <p:extLst>
+      <p:ext uri="{BB962C8B-B14F-4D97-AF65-F5344CB8AC3E}">
+        <p14:creationId xmlns:p14="http://schemas.microsoft.com/office/powerpoint/2010/main" val="3232560146"/>
+      </p:ext>
+    </p:extLst>
+  </p:cSld>
+  <p:clrMapOvr>
+    <a:masterClrMapping/>
+  </p:clrMapOvr>
+</p:sld>
+</file>
+
+<file path=ppt/slides/slide15.xml><?xml version="1.0" encoding="utf-8"?>
+<p:sld xmlns:a="http://schemas.openxmlformats.org/drawingml/2006/main" xmlns:r="http://schemas.openxmlformats.org/officeDocument/2006/relationships" xmlns:p="http://schemas.openxmlformats.org/presentationml/2006/main">
+  <p:cSld>
+    <p:spTree>
+      <p:nvGrpSpPr>
+        <p:cNvPr id="1" name=""/>
+        <p:cNvGrpSpPr/>
+        <p:nvPr/>
+      </p:nvGrpSpPr>
+      <p:grpSpPr>
+        <a:xfrm>
+          <a:off x="0" y="0"/>
+          <a:ext cx="0" cy="0"/>
+          <a:chOff x="0" y="0"/>
+          <a:chExt cx="0" cy="0"/>
+        </a:xfrm>
+      </p:grpSpPr>
+      <p:sp>
+        <p:nvSpPr>
+          <p:cNvPr id="2" name="Titre 1"/>
+          <p:cNvSpPr>
+            <a:spLocks noGrp="1"/>
+          </p:cNvSpPr>
+          <p:nvPr>
+            <p:ph type="title"/>
+          </p:nvPr>
+        </p:nvSpPr>
+        <p:spPr/>
+        <p:txBody>
+          <a:bodyPr rtlCol="0"/>
+          <a:lstStyle/>
+          <a:p>
+            <a:pPr rtl="0"/>
+            <a:endParaRPr lang="fr-FR" dirty="0"/>
+          </a:p>
+        </p:txBody>
+      </p:sp>
+      <p:sp>
+        <p:nvSpPr>
+          <p:cNvPr id="3" name="Espace réservé d’image 2"/>
+          <p:cNvSpPr>
+            <a:spLocks noGrp="1"/>
+          </p:cNvSpPr>
+          <p:nvPr>
+            <p:ph type="pic" idx="1"/>
+          </p:nvPr>
+        </p:nvSpPr>
+        <p:spPr/>
+      </p:sp>
+      <p:sp>
+        <p:nvSpPr>
+          <p:cNvPr id="4" name="Espace réservé du texte 3"/>
+          <p:cNvSpPr>
+            <a:spLocks noGrp="1"/>
+          </p:cNvSpPr>
+          <p:nvPr>
+            <p:ph type="body" sz="half" idx="2"/>
+          </p:nvPr>
+        </p:nvSpPr>
+        <p:spPr/>
+        <p:txBody>
+          <a:bodyPr rtlCol="0"/>
+          <a:lstStyle/>
+          <a:p>
+            <a:pPr rtl="0"/>
+            <a:endParaRPr lang="fr-FR" dirty="0"/>
+          </a:p>
+        </p:txBody>
+      </p:sp>
+    </p:spTree>
+    <p:extLst>
+      <p:ext uri="{BB962C8B-B14F-4D97-AF65-F5344CB8AC3E}">
+        <p14:creationId xmlns:p14="http://schemas.microsoft.com/office/powerpoint/2010/main" val="1857640680"/>
+      </p:ext>
+    </p:extLst>
+  </p:cSld>
+  <p:clrMapOvr>
+    <a:masterClrMapping/>
+  </p:clrMapOvr>
+</p:sld>
+</file>
+
 <file path=ppt/slides/slide2.xml><?xml version="1.0" encoding="utf-8"?>
 <p:sld xmlns:a="http://schemas.openxmlformats.org/drawingml/2006/main" xmlns:r="http://schemas.openxmlformats.org/officeDocument/2006/relationships" xmlns:p="http://schemas.openxmlformats.org/presentationml/2006/main">
   <p:cSld>
@@ -9618,10 +11123,7 @@
           <a:bodyPr/>
           <a:lstStyle/>
           <a:p>
-            <a:r>
-              <a:rPr lang="fr-FR"/>
-              <a:t>Créer un dépôt</a:t>
-            </a:r>
+            <a:endParaRPr lang="fr-FR"/>
           </a:p>
         </p:txBody>
       </p:sp>
@@ -9658,6 +11160,84 @@
 </file>
 
 <file path=ppt/slides/slide7.xml><?xml version="1.0" encoding="utf-8"?>
+<p:sld xmlns:a="http://schemas.openxmlformats.org/drawingml/2006/main" xmlns:r="http://schemas.openxmlformats.org/officeDocument/2006/relationships" xmlns:p="http://schemas.openxmlformats.org/presentationml/2006/main">
+  <p:cSld>
+    <p:spTree>
+      <p:nvGrpSpPr>
+        <p:cNvPr id="1" name=""/>
+        <p:cNvGrpSpPr/>
+        <p:nvPr/>
+      </p:nvGrpSpPr>
+      <p:grpSpPr>
+        <a:xfrm>
+          <a:off x="0" y="0"/>
+          <a:ext cx="0" cy="0"/>
+          <a:chOff x="0" y="0"/>
+          <a:chExt cx="0" cy="0"/>
+        </a:xfrm>
+      </p:grpSpPr>
+      <p:sp>
+        <p:nvSpPr>
+          <p:cNvPr id="2" name="Titre 1"/>
+          <p:cNvSpPr>
+            <a:spLocks noGrp="1"/>
+          </p:cNvSpPr>
+          <p:nvPr>
+            <p:ph type="title"/>
+          </p:nvPr>
+        </p:nvSpPr>
+        <p:spPr/>
+        <p:txBody>
+          <a:bodyPr rtlCol="0"/>
+          <a:lstStyle/>
+          <a:p>
+            <a:pPr rtl="0"/>
+            <a:r>
+              <a:rPr lang="fr-FR" dirty="0"/>
+              <a:t>Disposition de titre et de contenu avec graphique</a:t>
+            </a:r>
+          </a:p>
+        </p:txBody>
+      </p:sp>
+      <p:graphicFrame>
+        <p:nvGraphicFramePr>
+          <p:cNvPr id="13" name="Espace réservé du contenu 12" descr="Histogramme groupé" title="Graphique"/>
+          <p:cNvGraphicFramePr>
+            <a:graphicFrameLocks noGrp="1"/>
+          </p:cNvGraphicFramePr>
+          <p:nvPr>
+            <p:ph idx="1"/>
+            <p:extLst>
+              <p:ext uri="{D42A27DB-BD31-4B8C-83A1-F6EECF244321}">
+                <p14:modId xmlns:p14="http://schemas.microsoft.com/office/powerpoint/2010/main" val="4282484263"/>
+              </p:ext>
+            </p:extLst>
+          </p:nvPr>
+        </p:nvGraphicFramePr>
+        <p:xfrm>
+          <a:off x="1524000" y="1828800"/>
+          <a:ext cx="9144000" cy="4267200"/>
+        </p:xfrm>
+        <a:graphic>
+          <a:graphicData uri="http://schemas.openxmlformats.org/drawingml/2006/chart">
+            <c:chart xmlns:c="http://schemas.openxmlformats.org/drawingml/2006/chart" xmlns:r="http://schemas.openxmlformats.org/officeDocument/2006/relationships" r:id="rId2"/>
+          </a:graphicData>
+        </a:graphic>
+      </p:graphicFrame>
+    </p:spTree>
+    <p:extLst>
+      <p:ext uri="{BB962C8B-B14F-4D97-AF65-F5344CB8AC3E}">
+        <p14:creationId xmlns:p14="http://schemas.microsoft.com/office/powerpoint/2010/main" val="2116190161"/>
+      </p:ext>
+    </p:extLst>
+  </p:cSld>
+  <p:clrMapOvr>
+    <a:masterClrMapping/>
+  </p:clrMapOvr>
+</p:sld>
+</file>
+
+<file path=ppt/slides/slide8.xml><?xml version="1.0" encoding="utf-8"?>
 <p:sld xmlns:a="http://schemas.openxmlformats.org/drawingml/2006/main" xmlns:r="http://schemas.openxmlformats.org/officeDocument/2006/relationships" xmlns:p="http://schemas.openxmlformats.org/presentationml/2006/main">
   <p:cSld>
     <p:spTree>
@@ -9992,7 +11572,7 @@
 </p:sld>
 </file>
 
-<file path=ppt/slides/slide8.xml><?xml version="1.0" encoding="utf-8"?>
+<file path=ppt/slides/slide9.xml><?xml version="1.0" encoding="utf-8"?>
 <p:sld xmlns:a="http://schemas.openxmlformats.org/drawingml/2006/main" xmlns:r="http://schemas.openxmlformats.org/officeDocument/2006/relationships" xmlns:p="http://schemas.openxmlformats.org/presentationml/2006/main">
   <p:cSld>
     <p:spTree>
@@ -10859,129 +12439,12 @@
 </file>
 
 <file path=customXml/item1.xml><?xml version="1.0" encoding="utf-8"?>
-<p:properties xmlns:p="http://schemas.microsoft.com/office/2006/metadata/properties" xmlns:xsi="http://www.w3.org/2001/XMLSchema-instance" xmlns:pc="http://schemas.microsoft.com/office/infopath/2007/PartnerControls">
-  <documentManagement>
-    <DirectSourceMarket xmlns="4873beb7-5857-4685-be1f-d57550cc96cc" xsi:nil="true"/>
-    <ApprovalStatus xmlns="4873beb7-5857-4685-be1f-d57550cc96cc">InProgress</ApprovalStatus>
-    <MarketSpecific xmlns="4873beb7-5857-4685-be1f-d57550cc96cc">false</MarketSpecific>
-    <LocComments xmlns="4873beb7-5857-4685-be1f-d57550cc96cc" xsi:nil="true"/>
-    <ThumbnailAssetId xmlns="4873beb7-5857-4685-be1f-d57550cc96cc" xsi:nil="true"/>
-    <PrimaryImageGen xmlns="4873beb7-5857-4685-be1f-d57550cc96cc">true</PrimaryImageGen>
-    <LegacyData xmlns="4873beb7-5857-4685-be1f-d57550cc96cc" xsi:nil="true"/>
-    <LocRecommendedHandoff xmlns="4873beb7-5857-4685-be1f-d57550cc96cc" xsi:nil="true"/>
-    <BusinessGroup xmlns="4873beb7-5857-4685-be1f-d57550cc96cc" xsi:nil="true"/>
-    <BlockPublish xmlns="4873beb7-5857-4685-be1f-d57550cc96cc">false</BlockPublish>
-    <TPFriendlyName xmlns="4873beb7-5857-4685-be1f-d57550cc96cc" xsi:nil="true"/>
-    <NumericId xmlns="4873beb7-5857-4685-be1f-d57550cc96cc" xsi:nil="true"/>
-    <APEditor xmlns="4873beb7-5857-4685-be1f-d57550cc96cc">
-      <UserInfo>
-        <DisplayName/>
-        <AccountId xsi:nil="true"/>
-        <AccountType/>
-      </UserInfo>
-    </APEditor>
-    <SourceTitle xmlns="4873beb7-5857-4685-be1f-d57550cc96cc" xsi:nil="true"/>
-    <OpenTemplate xmlns="4873beb7-5857-4685-be1f-d57550cc96cc">true</OpenTemplate>
-    <UALocComments xmlns="4873beb7-5857-4685-be1f-d57550cc96cc" xsi:nil="true"/>
-    <ParentAssetId xmlns="4873beb7-5857-4685-be1f-d57550cc96cc" xsi:nil="true"/>
-    <IntlLangReviewDate xmlns="4873beb7-5857-4685-be1f-d57550cc96cc" xsi:nil="true"/>
-    <FeatureTagsTaxHTField0 xmlns="4873beb7-5857-4685-be1f-d57550cc96cc">
-      <Terms xmlns="http://schemas.microsoft.com/office/infopath/2007/PartnerControls"/>
-    </FeatureTagsTaxHTField0>
-    <PublishStatusLookup xmlns="4873beb7-5857-4685-be1f-d57550cc96cc">
-      <Value>1566889</Value>
-    </PublishStatusLookup>
-    <Providers xmlns="4873beb7-5857-4685-be1f-d57550cc96cc" xsi:nil="true"/>
-    <MachineTranslated xmlns="4873beb7-5857-4685-be1f-d57550cc96cc">false</MachineTranslated>
-    <OriginalSourceMarket xmlns="4873beb7-5857-4685-be1f-d57550cc96cc" xsi:nil="true"/>
-    <APDescription xmlns="4873beb7-5857-4685-be1f-d57550cc96cc" xsi:nil="true"/>
-    <ClipArtFilename xmlns="4873beb7-5857-4685-be1f-d57550cc96cc" xsi:nil="true"/>
-    <ContentItem xmlns="4873beb7-5857-4685-be1f-d57550cc96cc" xsi:nil="true"/>
-    <TPInstallLocation xmlns="4873beb7-5857-4685-be1f-d57550cc96cc" xsi:nil="true"/>
-    <PublishTargets xmlns="4873beb7-5857-4685-be1f-d57550cc96cc">OfficeOnlineVNext</PublishTargets>
-    <TimesCloned xmlns="4873beb7-5857-4685-be1f-d57550cc96cc" xsi:nil="true"/>
-    <AssetStart xmlns="4873beb7-5857-4685-be1f-d57550cc96cc">2012-05-23T08:44:00+00:00</AssetStart>
-    <Provider xmlns="4873beb7-5857-4685-be1f-d57550cc96cc" xsi:nil="true"/>
-    <AcquiredFrom xmlns="4873beb7-5857-4685-be1f-d57550cc96cc">Internal MS</AcquiredFrom>
-    <FriendlyTitle xmlns="4873beb7-5857-4685-be1f-d57550cc96cc" xsi:nil="true"/>
-    <LastHandOff xmlns="4873beb7-5857-4685-be1f-d57550cc96cc" xsi:nil="true"/>
-    <TPClientViewer xmlns="4873beb7-5857-4685-be1f-d57550cc96cc" xsi:nil="true"/>
-    <UACurrentWords xmlns="4873beb7-5857-4685-be1f-d57550cc96cc" xsi:nil="true"/>
-    <ArtSampleDocs xmlns="4873beb7-5857-4685-be1f-d57550cc96cc" xsi:nil="true"/>
-    <UALocRecommendation xmlns="4873beb7-5857-4685-be1f-d57550cc96cc">Localize</UALocRecommendation>
-    <Manager xmlns="4873beb7-5857-4685-be1f-d57550cc96cc" xsi:nil="true"/>
-    <ShowIn xmlns="4873beb7-5857-4685-be1f-d57550cc96cc">Show everywhere</ShowIn>
-    <UANotes xmlns="4873beb7-5857-4685-be1f-d57550cc96cc" xsi:nil="true"/>
-    <TemplateStatus xmlns="4873beb7-5857-4685-be1f-d57550cc96cc">Complete</TemplateStatus>
-    <InternalTagsTaxHTField0 xmlns="4873beb7-5857-4685-be1f-d57550cc96cc">
-      <Terms xmlns="http://schemas.microsoft.com/office/infopath/2007/PartnerControls"/>
-    </InternalTagsTaxHTField0>
-    <CSXHash xmlns="4873beb7-5857-4685-be1f-d57550cc96cc" xsi:nil="true"/>
-    <Downloads xmlns="4873beb7-5857-4685-be1f-d57550cc96cc">0</Downloads>
-    <VoteCount xmlns="4873beb7-5857-4685-be1f-d57550cc96cc" xsi:nil="true"/>
-    <OOCacheId xmlns="4873beb7-5857-4685-be1f-d57550cc96cc" xsi:nil="true"/>
-    <IsDeleted xmlns="4873beb7-5857-4685-be1f-d57550cc96cc">false</IsDeleted>
-    <AssetExpire xmlns="4873beb7-5857-4685-be1f-d57550cc96cc">2029-01-01T08:00:00+00:00</AssetExpire>
-    <DSATActionTaken xmlns="4873beb7-5857-4685-be1f-d57550cc96cc" xsi:nil="true"/>
-    <CSXSubmissionMarket xmlns="4873beb7-5857-4685-be1f-d57550cc96cc" xsi:nil="true"/>
-    <TPExecutable xmlns="4873beb7-5857-4685-be1f-d57550cc96cc" xsi:nil="true"/>
-    <SubmitterId xmlns="4873beb7-5857-4685-be1f-d57550cc96cc" xsi:nil="true"/>
-    <EditorialTags xmlns="4873beb7-5857-4685-be1f-d57550cc96cc" xsi:nil="true"/>
-    <ApprovalLog xmlns="4873beb7-5857-4685-be1f-d57550cc96cc" xsi:nil="true"/>
-    <AssetType xmlns="4873beb7-5857-4685-be1f-d57550cc96cc">TP</AssetType>
-    <BugNumber xmlns="4873beb7-5857-4685-be1f-d57550cc96cc" xsi:nil="true"/>
-    <CSXSubmissionDate xmlns="4873beb7-5857-4685-be1f-d57550cc96cc" xsi:nil="true"/>
-    <CSXUpdate xmlns="4873beb7-5857-4685-be1f-d57550cc96cc">false</CSXUpdate>
-    <Milestone xmlns="4873beb7-5857-4685-be1f-d57550cc96cc" xsi:nil="true"/>
-    <RecommendationsModifier xmlns="4873beb7-5857-4685-be1f-d57550cc96cc" xsi:nil="true"/>
-    <OriginAsset xmlns="4873beb7-5857-4685-be1f-d57550cc96cc" xsi:nil="true"/>
-    <TPComponent xmlns="4873beb7-5857-4685-be1f-d57550cc96cc" xsi:nil="true"/>
-    <AssetId xmlns="4873beb7-5857-4685-be1f-d57550cc96cc">TP102901017</AssetId>
-    <IntlLocPriority xmlns="4873beb7-5857-4685-be1f-d57550cc96cc" xsi:nil="true"/>
-    <PolicheckWords xmlns="4873beb7-5857-4685-be1f-d57550cc96cc" xsi:nil="true"/>
-    <TPLaunchHelpLink xmlns="4873beb7-5857-4685-be1f-d57550cc96cc" xsi:nil="true"/>
-    <TPApplication xmlns="4873beb7-5857-4685-be1f-d57550cc96cc" xsi:nil="true"/>
-    <CrawlForDependencies xmlns="4873beb7-5857-4685-be1f-d57550cc96cc">false</CrawlForDependencies>
-    <HandoffToMSDN xmlns="4873beb7-5857-4685-be1f-d57550cc96cc" xsi:nil="true"/>
-    <PlannedPubDate xmlns="4873beb7-5857-4685-be1f-d57550cc96cc" xsi:nil="true"/>
-    <IntlLangReviewer xmlns="4873beb7-5857-4685-be1f-d57550cc96cc" xsi:nil="true"/>
-    <TrustLevel xmlns="4873beb7-5857-4685-be1f-d57550cc96cc">1 Microsoft Managed Content</TrustLevel>
-    <LocLastLocAttemptVersionLookup xmlns="4873beb7-5857-4685-be1f-d57550cc96cc">836753</LocLastLocAttemptVersionLookup>
-    <IsSearchable xmlns="4873beb7-5857-4685-be1f-d57550cc96cc">true</IsSearchable>
-    <TemplateTemplateType xmlns="4873beb7-5857-4685-be1f-d57550cc96cc">PowerPoint Design Template</TemplateTemplateType>
-    <CampaignTagsTaxHTField0 xmlns="4873beb7-5857-4685-be1f-d57550cc96cc">
-      <Terms xmlns="http://schemas.microsoft.com/office/infopath/2007/PartnerControls"/>
-    </CampaignTagsTaxHTField0>
-    <TPNamespace xmlns="4873beb7-5857-4685-be1f-d57550cc96cc" xsi:nil="true"/>
-    <TaxCatchAll xmlns="4873beb7-5857-4685-be1f-d57550cc96cc"/>
-    <Markets xmlns="4873beb7-5857-4685-be1f-d57550cc96cc"/>
-    <UAProjectedTotalWords xmlns="4873beb7-5857-4685-be1f-d57550cc96cc" xsi:nil="true"/>
-    <IntlLangReview xmlns="4873beb7-5857-4685-be1f-d57550cc96cc">false</IntlLangReview>
-    <OutputCachingOn xmlns="4873beb7-5857-4685-be1f-d57550cc96cc">false</OutputCachingOn>
-    <AverageRating xmlns="4873beb7-5857-4685-be1f-d57550cc96cc" xsi:nil="true"/>
-    <APAuthor xmlns="4873beb7-5857-4685-be1f-d57550cc96cc">
-      <UserInfo>
-        <DisplayName>REDMOND\v-anij</DisplayName>
-        <AccountId>2469</AccountId>
-        <AccountType/>
-      </UserInfo>
-    </APAuthor>
-    <LocManualTestRequired xmlns="4873beb7-5857-4685-be1f-d57550cc96cc">false</LocManualTestRequired>
-    <TPCommandLine xmlns="4873beb7-5857-4685-be1f-d57550cc96cc" xsi:nil="true"/>
-    <TPAppVersion xmlns="4873beb7-5857-4685-be1f-d57550cc96cc" xsi:nil="true"/>
-    <EditorialStatus xmlns="4873beb7-5857-4685-be1f-d57550cc96cc">Complete</EditorialStatus>
-    <LastModifiedDateTime xmlns="4873beb7-5857-4685-be1f-d57550cc96cc" xsi:nil="true"/>
-    <ScenarioTagsTaxHTField0 xmlns="4873beb7-5857-4685-be1f-d57550cc96cc">
-      <Terms xmlns="http://schemas.microsoft.com/office/infopath/2007/PartnerControls"/>
-    </ScenarioTagsTaxHTField0>
-    <OriginalRelease xmlns="4873beb7-5857-4685-be1f-d57550cc96cc">15</OriginalRelease>
-    <TPLaunchHelpLinkType xmlns="4873beb7-5857-4685-be1f-d57550cc96cc">Template</TPLaunchHelpLinkType>
-    <LocalizationTagsTaxHTField0 xmlns="4873beb7-5857-4685-be1f-d57550cc96cc">
-      <Terms xmlns="http://schemas.microsoft.com/office/infopath/2007/PartnerControls"/>
-    </LocalizationTagsTaxHTField0>
-    <LocMarketGroupTiers2 xmlns="4873beb7-5857-4685-be1f-d57550cc96cc" xsi:nil="true"/>
-  </documentManagement>
-</p:properties>
+<?mso-contentType ?>
+<FormTemplates xmlns="http://schemas.microsoft.com/sharepoint/v3/contenttype/forms">
+  <Display>DocumentLibraryForm</Display>
+  <Edit>AssetEditForm</Edit>
+  <New>DocumentLibraryForm</New>
+</FormTemplates>
 </file>
 
 <file path=customXml/item2.xml><?xml version="1.0" encoding="utf-8"?>
@@ -12025,26 +13488,135 @@
 </file>
 
 <file path=customXml/item3.xml><?xml version="1.0" encoding="utf-8"?>
-<?mso-contentType ?>
-<FormTemplates xmlns="http://schemas.microsoft.com/sharepoint/v3/contenttype/forms">
-  <Display>DocumentLibraryForm</Display>
-  <Edit>AssetEditForm</Edit>
-  <New>DocumentLibraryForm</New>
-</FormTemplates>
+<p:properties xmlns:p="http://schemas.microsoft.com/office/2006/metadata/properties" xmlns:xsi="http://www.w3.org/2001/XMLSchema-instance" xmlns:pc="http://schemas.microsoft.com/office/infopath/2007/PartnerControls">
+  <documentManagement>
+    <DirectSourceMarket xmlns="4873beb7-5857-4685-be1f-d57550cc96cc" xsi:nil="true"/>
+    <ApprovalStatus xmlns="4873beb7-5857-4685-be1f-d57550cc96cc">InProgress</ApprovalStatus>
+    <MarketSpecific xmlns="4873beb7-5857-4685-be1f-d57550cc96cc">false</MarketSpecific>
+    <LocComments xmlns="4873beb7-5857-4685-be1f-d57550cc96cc" xsi:nil="true"/>
+    <ThumbnailAssetId xmlns="4873beb7-5857-4685-be1f-d57550cc96cc" xsi:nil="true"/>
+    <PrimaryImageGen xmlns="4873beb7-5857-4685-be1f-d57550cc96cc">true</PrimaryImageGen>
+    <LegacyData xmlns="4873beb7-5857-4685-be1f-d57550cc96cc" xsi:nil="true"/>
+    <LocRecommendedHandoff xmlns="4873beb7-5857-4685-be1f-d57550cc96cc" xsi:nil="true"/>
+    <BusinessGroup xmlns="4873beb7-5857-4685-be1f-d57550cc96cc" xsi:nil="true"/>
+    <BlockPublish xmlns="4873beb7-5857-4685-be1f-d57550cc96cc">false</BlockPublish>
+    <TPFriendlyName xmlns="4873beb7-5857-4685-be1f-d57550cc96cc" xsi:nil="true"/>
+    <NumericId xmlns="4873beb7-5857-4685-be1f-d57550cc96cc" xsi:nil="true"/>
+    <APEditor xmlns="4873beb7-5857-4685-be1f-d57550cc96cc">
+      <UserInfo>
+        <DisplayName/>
+        <AccountId xsi:nil="true"/>
+        <AccountType/>
+      </UserInfo>
+    </APEditor>
+    <SourceTitle xmlns="4873beb7-5857-4685-be1f-d57550cc96cc" xsi:nil="true"/>
+    <OpenTemplate xmlns="4873beb7-5857-4685-be1f-d57550cc96cc">true</OpenTemplate>
+    <UALocComments xmlns="4873beb7-5857-4685-be1f-d57550cc96cc" xsi:nil="true"/>
+    <ParentAssetId xmlns="4873beb7-5857-4685-be1f-d57550cc96cc" xsi:nil="true"/>
+    <IntlLangReviewDate xmlns="4873beb7-5857-4685-be1f-d57550cc96cc" xsi:nil="true"/>
+    <FeatureTagsTaxHTField0 xmlns="4873beb7-5857-4685-be1f-d57550cc96cc">
+      <Terms xmlns="http://schemas.microsoft.com/office/infopath/2007/PartnerControls"/>
+    </FeatureTagsTaxHTField0>
+    <PublishStatusLookup xmlns="4873beb7-5857-4685-be1f-d57550cc96cc">
+      <Value>1566889</Value>
+    </PublishStatusLookup>
+    <Providers xmlns="4873beb7-5857-4685-be1f-d57550cc96cc" xsi:nil="true"/>
+    <MachineTranslated xmlns="4873beb7-5857-4685-be1f-d57550cc96cc">false</MachineTranslated>
+    <OriginalSourceMarket xmlns="4873beb7-5857-4685-be1f-d57550cc96cc" xsi:nil="true"/>
+    <APDescription xmlns="4873beb7-5857-4685-be1f-d57550cc96cc" xsi:nil="true"/>
+    <ClipArtFilename xmlns="4873beb7-5857-4685-be1f-d57550cc96cc" xsi:nil="true"/>
+    <ContentItem xmlns="4873beb7-5857-4685-be1f-d57550cc96cc" xsi:nil="true"/>
+    <TPInstallLocation xmlns="4873beb7-5857-4685-be1f-d57550cc96cc" xsi:nil="true"/>
+    <PublishTargets xmlns="4873beb7-5857-4685-be1f-d57550cc96cc">OfficeOnlineVNext</PublishTargets>
+    <TimesCloned xmlns="4873beb7-5857-4685-be1f-d57550cc96cc" xsi:nil="true"/>
+    <AssetStart xmlns="4873beb7-5857-4685-be1f-d57550cc96cc">2012-05-23T08:44:00+00:00</AssetStart>
+    <Provider xmlns="4873beb7-5857-4685-be1f-d57550cc96cc" xsi:nil="true"/>
+    <AcquiredFrom xmlns="4873beb7-5857-4685-be1f-d57550cc96cc">Internal MS</AcquiredFrom>
+    <FriendlyTitle xmlns="4873beb7-5857-4685-be1f-d57550cc96cc" xsi:nil="true"/>
+    <LastHandOff xmlns="4873beb7-5857-4685-be1f-d57550cc96cc" xsi:nil="true"/>
+    <TPClientViewer xmlns="4873beb7-5857-4685-be1f-d57550cc96cc" xsi:nil="true"/>
+    <UACurrentWords xmlns="4873beb7-5857-4685-be1f-d57550cc96cc" xsi:nil="true"/>
+    <ArtSampleDocs xmlns="4873beb7-5857-4685-be1f-d57550cc96cc" xsi:nil="true"/>
+    <UALocRecommendation xmlns="4873beb7-5857-4685-be1f-d57550cc96cc">Localize</UALocRecommendation>
+    <Manager xmlns="4873beb7-5857-4685-be1f-d57550cc96cc" xsi:nil="true"/>
+    <ShowIn xmlns="4873beb7-5857-4685-be1f-d57550cc96cc">Show everywhere</ShowIn>
+    <UANotes xmlns="4873beb7-5857-4685-be1f-d57550cc96cc" xsi:nil="true"/>
+    <TemplateStatus xmlns="4873beb7-5857-4685-be1f-d57550cc96cc">Complete</TemplateStatus>
+    <InternalTagsTaxHTField0 xmlns="4873beb7-5857-4685-be1f-d57550cc96cc">
+      <Terms xmlns="http://schemas.microsoft.com/office/infopath/2007/PartnerControls"/>
+    </InternalTagsTaxHTField0>
+    <CSXHash xmlns="4873beb7-5857-4685-be1f-d57550cc96cc" xsi:nil="true"/>
+    <Downloads xmlns="4873beb7-5857-4685-be1f-d57550cc96cc">0</Downloads>
+    <VoteCount xmlns="4873beb7-5857-4685-be1f-d57550cc96cc" xsi:nil="true"/>
+    <OOCacheId xmlns="4873beb7-5857-4685-be1f-d57550cc96cc" xsi:nil="true"/>
+    <IsDeleted xmlns="4873beb7-5857-4685-be1f-d57550cc96cc">false</IsDeleted>
+    <AssetExpire xmlns="4873beb7-5857-4685-be1f-d57550cc96cc">2029-01-01T08:00:00+00:00</AssetExpire>
+    <DSATActionTaken xmlns="4873beb7-5857-4685-be1f-d57550cc96cc" xsi:nil="true"/>
+    <CSXSubmissionMarket xmlns="4873beb7-5857-4685-be1f-d57550cc96cc" xsi:nil="true"/>
+    <TPExecutable xmlns="4873beb7-5857-4685-be1f-d57550cc96cc" xsi:nil="true"/>
+    <SubmitterId xmlns="4873beb7-5857-4685-be1f-d57550cc96cc" xsi:nil="true"/>
+    <EditorialTags xmlns="4873beb7-5857-4685-be1f-d57550cc96cc" xsi:nil="true"/>
+    <ApprovalLog xmlns="4873beb7-5857-4685-be1f-d57550cc96cc" xsi:nil="true"/>
+    <AssetType xmlns="4873beb7-5857-4685-be1f-d57550cc96cc">TP</AssetType>
+    <BugNumber xmlns="4873beb7-5857-4685-be1f-d57550cc96cc" xsi:nil="true"/>
+    <CSXSubmissionDate xmlns="4873beb7-5857-4685-be1f-d57550cc96cc" xsi:nil="true"/>
+    <CSXUpdate xmlns="4873beb7-5857-4685-be1f-d57550cc96cc">false</CSXUpdate>
+    <Milestone xmlns="4873beb7-5857-4685-be1f-d57550cc96cc" xsi:nil="true"/>
+    <RecommendationsModifier xmlns="4873beb7-5857-4685-be1f-d57550cc96cc" xsi:nil="true"/>
+    <OriginAsset xmlns="4873beb7-5857-4685-be1f-d57550cc96cc" xsi:nil="true"/>
+    <TPComponent xmlns="4873beb7-5857-4685-be1f-d57550cc96cc" xsi:nil="true"/>
+    <AssetId xmlns="4873beb7-5857-4685-be1f-d57550cc96cc">TP102901017</AssetId>
+    <IntlLocPriority xmlns="4873beb7-5857-4685-be1f-d57550cc96cc" xsi:nil="true"/>
+    <PolicheckWords xmlns="4873beb7-5857-4685-be1f-d57550cc96cc" xsi:nil="true"/>
+    <TPLaunchHelpLink xmlns="4873beb7-5857-4685-be1f-d57550cc96cc" xsi:nil="true"/>
+    <TPApplication xmlns="4873beb7-5857-4685-be1f-d57550cc96cc" xsi:nil="true"/>
+    <CrawlForDependencies xmlns="4873beb7-5857-4685-be1f-d57550cc96cc">false</CrawlForDependencies>
+    <HandoffToMSDN xmlns="4873beb7-5857-4685-be1f-d57550cc96cc" xsi:nil="true"/>
+    <PlannedPubDate xmlns="4873beb7-5857-4685-be1f-d57550cc96cc" xsi:nil="true"/>
+    <IntlLangReviewer xmlns="4873beb7-5857-4685-be1f-d57550cc96cc" xsi:nil="true"/>
+    <TrustLevel xmlns="4873beb7-5857-4685-be1f-d57550cc96cc">1 Microsoft Managed Content</TrustLevel>
+    <LocLastLocAttemptVersionLookup xmlns="4873beb7-5857-4685-be1f-d57550cc96cc">836753</LocLastLocAttemptVersionLookup>
+    <IsSearchable xmlns="4873beb7-5857-4685-be1f-d57550cc96cc">true</IsSearchable>
+    <TemplateTemplateType xmlns="4873beb7-5857-4685-be1f-d57550cc96cc">PowerPoint Design Template</TemplateTemplateType>
+    <CampaignTagsTaxHTField0 xmlns="4873beb7-5857-4685-be1f-d57550cc96cc">
+      <Terms xmlns="http://schemas.microsoft.com/office/infopath/2007/PartnerControls"/>
+    </CampaignTagsTaxHTField0>
+    <TPNamespace xmlns="4873beb7-5857-4685-be1f-d57550cc96cc" xsi:nil="true"/>
+    <TaxCatchAll xmlns="4873beb7-5857-4685-be1f-d57550cc96cc"/>
+    <Markets xmlns="4873beb7-5857-4685-be1f-d57550cc96cc"/>
+    <UAProjectedTotalWords xmlns="4873beb7-5857-4685-be1f-d57550cc96cc" xsi:nil="true"/>
+    <IntlLangReview xmlns="4873beb7-5857-4685-be1f-d57550cc96cc">false</IntlLangReview>
+    <OutputCachingOn xmlns="4873beb7-5857-4685-be1f-d57550cc96cc">false</OutputCachingOn>
+    <AverageRating xmlns="4873beb7-5857-4685-be1f-d57550cc96cc" xsi:nil="true"/>
+    <APAuthor xmlns="4873beb7-5857-4685-be1f-d57550cc96cc">
+      <UserInfo>
+        <DisplayName>REDMOND\v-anij</DisplayName>
+        <AccountId>2469</AccountId>
+        <AccountType/>
+      </UserInfo>
+    </APAuthor>
+    <LocManualTestRequired xmlns="4873beb7-5857-4685-be1f-d57550cc96cc">false</LocManualTestRequired>
+    <TPCommandLine xmlns="4873beb7-5857-4685-be1f-d57550cc96cc" xsi:nil="true"/>
+    <TPAppVersion xmlns="4873beb7-5857-4685-be1f-d57550cc96cc" xsi:nil="true"/>
+    <EditorialStatus xmlns="4873beb7-5857-4685-be1f-d57550cc96cc">Complete</EditorialStatus>
+    <LastModifiedDateTime xmlns="4873beb7-5857-4685-be1f-d57550cc96cc" xsi:nil="true"/>
+    <ScenarioTagsTaxHTField0 xmlns="4873beb7-5857-4685-be1f-d57550cc96cc">
+      <Terms xmlns="http://schemas.microsoft.com/office/infopath/2007/PartnerControls"/>
+    </ScenarioTagsTaxHTField0>
+    <OriginalRelease xmlns="4873beb7-5857-4685-be1f-d57550cc96cc">15</OriginalRelease>
+    <TPLaunchHelpLinkType xmlns="4873beb7-5857-4685-be1f-d57550cc96cc">Template</TPLaunchHelpLinkType>
+    <LocalizationTagsTaxHTField0 xmlns="4873beb7-5857-4685-be1f-d57550cc96cc">
+      <Terms xmlns="http://schemas.microsoft.com/office/infopath/2007/PartnerControls"/>
+    </LocalizationTagsTaxHTField0>
+    <LocMarketGroupTiers2 xmlns="4873beb7-5857-4685-be1f-d57550cc96cc" xsi:nil="true"/>
+  </documentManagement>
+</p:properties>
 </file>
 
 <file path=customXml/itemProps1.xml><?xml version="1.0" encoding="utf-8"?>
-<ds:datastoreItem xmlns:ds="http://schemas.openxmlformats.org/officeDocument/2006/customXml" ds:itemID="{04098515-0C12-46CF-BC7C-69B4A13CD5FA}">
+<ds:datastoreItem xmlns:ds="http://schemas.openxmlformats.org/officeDocument/2006/customXml" ds:itemID="{746CFF6F-D9AA-4BC0-911A-0A1356771912}">
   <ds:schemaRefs>
-    <ds:schemaRef ds:uri="http://schemas.microsoft.com/office/infopath/2007/PartnerControls"/>
-    <ds:schemaRef ds:uri="http://purl.org/dc/terms/"/>
-    <ds:schemaRef ds:uri="http://purl.org/dc/dcmitype/"/>
-    <ds:schemaRef ds:uri="http://purl.org/dc/elements/1.1/"/>
-    <ds:schemaRef ds:uri="http://schemas.microsoft.com/office/2006/metadata/properties"/>
-    <ds:schemaRef ds:uri="4873beb7-5857-4685-be1f-d57550cc96cc"/>
-    <ds:schemaRef ds:uri="http://schemas.microsoft.com/office/2006/documentManagement/types"/>
-    <ds:schemaRef ds:uri="http://schemas.openxmlformats.org/package/2006/metadata/core-properties"/>
-    <ds:schemaRef ds:uri="http://www.w3.org/XML/1998/namespace"/>
+    <ds:schemaRef ds:uri="http://schemas.microsoft.com/sharepoint/v3/contenttype/forms"/>
   </ds:schemaRefs>
 </ds:datastoreItem>
 </file>
@@ -12068,9 +13640,17 @@
 </file>
 
 <file path=customXml/itemProps3.xml><?xml version="1.0" encoding="utf-8"?>
-<ds:datastoreItem xmlns:ds="http://schemas.openxmlformats.org/officeDocument/2006/customXml" ds:itemID="{746CFF6F-D9AA-4BC0-911A-0A1356771912}">
+<ds:datastoreItem xmlns:ds="http://schemas.openxmlformats.org/officeDocument/2006/customXml" ds:itemID="{04098515-0C12-46CF-BC7C-69B4A13CD5FA}">
   <ds:schemaRefs>
-    <ds:schemaRef ds:uri="http://schemas.microsoft.com/sharepoint/v3/contenttype/forms"/>
+    <ds:schemaRef ds:uri="http://schemas.microsoft.com/office/infopath/2007/PartnerControls"/>
+    <ds:schemaRef ds:uri="http://purl.org/dc/terms/"/>
+    <ds:schemaRef ds:uri="http://purl.org/dc/dcmitype/"/>
+    <ds:schemaRef ds:uri="http://purl.org/dc/elements/1.1/"/>
+    <ds:schemaRef ds:uri="http://schemas.microsoft.com/office/2006/metadata/properties"/>
+    <ds:schemaRef ds:uri="4873beb7-5857-4685-be1f-d57550cc96cc"/>
+    <ds:schemaRef ds:uri="http://schemas.microsoft.com/office/2006/documentManagement/types"/>
+    <ds:schemaRef ds:uri="http://schemas.openxmlformats.org/package/2006/metadata/core-properties"/>
+    <ds:schemaRef ds:uri="http://www.w3.org/XML/1998/namespace"/>
   </ds:schemaRefs>
 </ds:datastoreItem>
 </file>
</xml_diff>